<commit_message>
Added minor fixes to slides for projects
</commit_message>
<xml_diff>
--- a/slides/p4106 - projects.pptx
+++ b/slides/p4106 - projects.pptx
@@ -267,7 +267,7 @@
           <a:p>
             <a:fld id="{B5DD868A-E21B-DB4F-A0B4-679AD6AB37F3}" type="datetimeFigureOut">
               <a:rPr lang="en-US" smtClean="0"/>
-              <a:t>11/2/22</a:t>
+              <a:t>11/6/24</a:t>
             </a:fld>
             <a:endParaRPr lang="en-US"/>
           </a:p>
@@ -467,7 +467,7 @@
           <a:p>
             <a:fld id="{B5DD868A-E21B-DB4F-A0B4-679AD6AB37F3}" type="datetimeFigureOut">
               <a:rPr lang="en-US" smtClean="0"/>
-              <a:t>11/2/22</a:t>
+              <a:t>11/6/24</a:t>
             </a:fld>
             <a:endParaRPr lang="en-US"/>
           </a:p>
@@ -677,7 +677,7 @@
           <a:p>
             <a:fld id="{B5DD868A-E21B-DB4F-A0B4-679AD6AB37F3}" type="datetimeFigureOut">
               <a:rPr lang="en-US" smtClean="0"/>
-              <a:t>11/2/22</a:t>
+              <a:t>11/6/24</a:t>
             </a:fld>
             <a:endParaRPr lang="en-US"/>
           </a:p>
@@ -877,7 +877,7 @@
           <a:p>
             <a:fld id="{B5DD868A-E21B-DB4F-A0B4-679AD6AB37F3}" type="datetimeFigureOut">
               <a:rPr lang="en-US" smtClean="0"/>
-              <a:t>11/2/22</a:t>
+              <a:t>11/6/24</a:t>
             </a:fld>
             <a:endParaRPr lang="en-US"/>
           </a:p>
@@ -1153,7 +1153,7 @@
           <a:p>
             <a:fld id="{B5DD868A-E21B-DB4F-A0B4-679AD6AB37F3}" type="datetimeFigureOut">
               <a:rPr lang="en-US" smtClean="0"/>
-              <a:t>11/2/22</a:t>
+              <a:t>11/6/24</a:t>
             </a:fld>
             <a:endParaRPr lang="en-US"/>
           </a:p>
@@ -1421,7 +1421,7 @@
           <a:p>
             <a:fld id="{B5DD868A-E21B-DB4F-A0B4-679AD6AB37F3}" type="datetimeFigureOut">
               <a:rPr lang="en-US" smtClean="0"/>
-              <a:t>11/2/22</a:t>
+              <a:t>11/6/24</a:t>
             </a:fld>
             <a:endParaRPr lang="en-US"/>
           </a:p>
@@ -1836,7 +1836,7 @@
           <a:p>
             <a:fld id="{B5DD868A-E21B-DB4F-A0B4-679AD6AB37F3}" type="datetimeFigureOut">
               <a:rPr lang="en-US" smtClean="0"/>
-              <a:t>11/2/22</a:t>
+              <a:t>11/6/24</a:t>
             </a:fld>
             <a:endParaRPr lang="en-US"/>
           </a:p>
@@ -1978,7 +1978,7 @@
           <a:p>
             <a:fld id="{B5DD868A-E21B-DB4F-A0B4-679AD6AB37F3}" type="datetimeFigureOut">
               <a:rPr lang="en-US" smtClean="0"/>
-              <a:t>11/2/22</a:t>
+              <a:t>11/6/24</a:t>
             </a:fld>
             <a:endParaRPr lang="en-US"/>
           </a:p>
@@ -2091,7 +2091,7 @@
           <a:p>
             <a:fld id="{B5DD868A-E21B-DB4F-A0B4-679AD6AB37F3}" type="datetimeFigureOut">
               <a:rPr lang="en-US" smtClean="0"/>
-              <a:t>11/2/22</a:t>
+              <a:t>11/6/24</a:t>
             </a:fld>
             <a:endParaRPr lang="en-US"/>
           </a:p>
@@ -2404,7 +2404,7 @@
           <a:p>
             <a:fld id="{B5DD868A-E21B-DB4F-A0B4-679AD6AB37F3}" type="datetimeFigureOut">
               <a:rPr lang="en-US" smtClean="0"/>
-              <a:t>11/2/22</a:t>
+              <a:t>11/6/24</a:t>
             </a:fld>
             <a:endParaRPr lang="en-US"/>
           </a:p>
@@ -2693,7 +2693,7 @@
           <a:p>
             <a:fld id="{B5DD868A-E21B-DB4F-A0B4-679AD6AB37F3}" type="datetimeFigureOut">
               <a:rPr lang="en-US" smtClean="0"/>
-              <a:t>11/2/22</a:t>
+              <a:t>11/6/24</a:t>
             </a:fld>
             <a:endParaRPr lang="en-US"/>
           </a:p>
@@ -2936,7 +2936,7 @@
           <a:p>
             <a:fld id="{B5DD868A-E21B-DB4F-A0B4-679AD6AB37F3}" type="datetimeFigureOut">
               <a:rPr lang="en-US" smtClean="0"/>
-              <a:t>11/2/22</a:t>
+              <a:t>11/6/24</a:t>
             </a:fld>
             <a:endParaRPr lang="en-US"/>
           </a:p>
@@ -3403,8 +3403,8 @@
           <a:lstStyle/>
           <a:p>
             <a:r>
-              <a:rPr lang="en-US" dirty="0"/>
-              <a:t>PS4106 </a:t>
+              <a:rPr lang="en-US"/>
+              <a:t>PN4106 </a:t>
             </a:r>
             <a:endParaRPr lang="en-US" b="1" dirty="0"/>
           </a:p>
@@ -3536,7 +3536,7 @@
             <a:pPr lvl="1"/>
             <a:r>
               <a:rPr lang="en-US" dirty="0"/>
-              <a:t>(Note Qualitative is fine, no inferential statistics are required)</a:t>
+              <a:t>(Note descriptive is fine, no inferential statistics are required)</a:t>
             </a:r>
           </a:p>
           <a:p>
@@ -3640,13 +3640,13 @@
           <a:p>
             <a:r>
               <a:rPr lang="en-US" dirty="0"/>
-              <a:t>Pick your project by Friday Week 9.</a:t>
+              <a:t>Ideally Pick your project by Friday Week 9.</a:t>
             </a:r>
           </a:p>
           <a:p>
             <a:r>
               <a:rPr lang="en-US" dirty="0"/>
-              <a:t>Email me:</a:t>
+              <a:t>Optional feedback on project.  I’ll send a link for you to submit:</a:t>
             </a:r>
           </a:p>
           <a:p>
@@ -3667,13 +3667,8 @@
             <a:pPr lvl="1"/>
             <a:r>
               <a:rPr lang="en-US" dirty="0"/>
-              <a:t>Any question you might </a:t>
-            </a:r>
-            <a:r>
-              <a:rPr lang="en-US" dirty="0" err="1"/>
-              <a:t>hae</a:t>
-            </a:r>
-            <a:endParaRPr lang="en-US" dirty="0"/>
+              <a:t>Any question you might have</a:t>
+            </a:r>
           </a:p>
         </p:txBody>
       </p:sp>
@@ -4051,7 +4046,7 @@
 </file>
 
 <file path=ppt/slides/slide7.xml><?xml version="1.0" encoding="utf-8"?>
-<p:sld xmlns:a="http://schemas.openxmlformats.org/drawingml/2006/main" xmlns:r="http://schemas.openxmlformats.org/officeDocument/2006/relationships" xmlns:p="http://schemas.openxmlformats.org/presentationml/2006/main">
+<p:sld xmlns:a="http://schemas.openxmlformats.org/drawingml/2006/main" xmlns:r="http://schemas.openxmlformats.org/officeDocument/2006/relationships" xmlns:p="http://schemas.openxmlformats.org/presentationml/2006/main" show="0">
   <p:cSld>
     <p:spTree>
       <p:nvGrpSpPr>

</xml_diff>